<commit_message>
Update GIAIC-Introduction to TypeScript.pptx
minor updates
</commit_message>
<xml_diff>
--- a/presentations/GIAIC-Introduction to TypeScript.pptx
+++ b/presentations/GIAIC-Introduction to TypeScript.pptx
@@ -120,6 +120,11 @@
       </a:defRPr>
     </a:lvl9pPr>
   </p:defaultTextStyle>
+  <p:extLst>
+    <p:ext uri="{EFAFB233-063F-42B5-8137-9DF3F51BA10A}">
+      <p15:sldGuideLst xmlns:p15="http://schemas.microsoft.com/office/powerpoint/2012/main"/>
+    </p:ext>
+  </p:extLst>
 </p:presentation>
 </file>
 
@@ -15901,30 +15906,14 @@
           <a:p>
             <a:r>
               <a:rPr lang="en-US" dirty="0"/>
-              <a:t>Areas of </a:t>
-            </a:r>
-            <a:r>
-              <a:rPr lang="en-US" dirty="0" err="1"/>
-              <a:t>Experties</a:t>
-            </a:r>
+              <a:t>Areas of Expertise:</a:t>
+            </a:r>
+          </a:p>
+          <a:p>
+            <a:pPr lvl="1"/>
             <a:r>
               <a:rPr lang="en-US" dirty="0"/>
-              <a:t>:</a:t>
-            </a:r>
-          </a:p>
-          <a:p>
-            <a:pPr lvl="1"/>
-            <a:r>
-              <a:rPr lang="en-US" dirty="0"/>
-              <a:t>Payments, </a:t>
-            </a:r>
-            <a:r>
-              <a:rPr lang="en-US" dirty="0" err="1"/>
-              <a:t>Fintechs</a:t>
-            </a:r>
-            <a:r>
-              <a:rPr lang="en-US" dirty="0"/>
-              <a:t>, Banking and Finance, Branchless Banking, Software Engineering and Architecture, Application Desing, UI/UX Invision, Business Intelligence.</a:t>
+              <a:t>Payments, FinTech, Banking and Finance, Branchless Banking, Software Engineering and Architecture, Application Desing, UI/UX Invision, Business Intelligence.</a:t>
             </a:r>
           </a:p>
         </p:txBody>

</xml_diff>